<commit_message>
Update done differently slide
</commit_message>
<xml_diff>
--- a/Final_Presentation.pptx
+++ b/Final_Presentation.pptx
@@ -106,7 +106,41 @@
       </a:defRPr>
     </a:lvl9pPr>
   </p:defaultTextStyle>
+  <p:extLst>
+    <p:ext uri="{EFAFB233-063F-42B5-8137-9DF3F51BA10A}">
+      <p15:sldGuideLst xmlns:p15="http://schemas.microsoft.com/office/powerpoint/2012/main"/>
+    </p:ext>
+  </p:extLst>
 </p:presentation>
+</file>
+
+<file path=ppt/changesInfos/changesInfo1.xml><?xml version="1.0" encoding="utf-8"?>
+<pc:chgInfo xmlns:a="http://schemas.openxmlformats.org/drawingml/2006/main" xmlns:r="http://schemas.openxmlformats.org/officeDocument/2006/relationships" xmlns:ac="http://schemas.microsoft.com/office/drawing/2013/main/command" xmlns:pc="http://schemas.microsoft.com/office/powerpoint/2013/main/command">
+  <pc:docChgLst>
+    <pc:chgData name="Benoit Ortalo-Magne" userId="0b2593114f9d29e7" providerId="LiveId" clId="{0D839842-451F-4C90-80FD-EAA5F1808561}"/>
+    <pc:docChg chg="custSel modSld">
+      <pc:chgData name="Benoit Ortalo-Magne" userId="0b2593114f9d29e7" providerId="LiveId" clId="{0D839842-451F-4C90-80FD-EAA5F1808561}" dt="2020-12-09T23:12:36.972" v="51" actId="20577"/>
+      <pc:docMkLst>
+        <pc:docMk/>
+      </pc:docMkLst>
+      <pc:sldChg chg="modSp">
+        <pc:chgData name="Benoit Ortalo-Magne" userId="0b2593114f9d29e7" providerId="LiveId" clId="{0D839842-451F-4C90-80FD-EAA5F1808561}" dt="2020-12-09T23:12:36.972" v="51" actId="20577"/>
+        <pc:sldMkLst>
+          <pc:docMk/>
+          <pc:sldMk cId="2279593750" sldId="258"/>
+        </pc:sldMkLst>
+        <pc:spChg chg="mod">
+          <ac:chgData name="Benoit Ortalo-Magne" userId="0b2593114f9d29e7" providerId="LiveId" clId="{0D839842-451F-4C90-80FD-EAA5F1808561}" dt="2020-12-09T23:12:36.972" v="51" actId="20577"/>
+          <ac:spMkLst>
+            <pc:docMk/>
+            <pc:sldMk cId="2279593750" sldId="258"/>
+            <ac:spMk id="3" creationId="{3D4641FA-7368-45E4-BF1C-4A27E164B815}"/>
+          </ac:spMkLst>
+        </pc:spChg>
+      </pc:sldChg>
+    </pc:docChg>
+  </pc:docChgLst>
+</pc:chgInfo>
 </file>
 
 <file path=ppt/slideLayouts/slideLayout1.xml><?xml version="1.0" encoding="utf-8"?>
@@ -290,7 +324,7 @@
           <a:p>
             <a:fld id="{84865227-8B12-4541-9CD8-0F4500E665CC}" type="datetimeFigureOut">
               <a:rPr lang="en-US" smtClean="0"/>
-              <a:t>12/7/2020</a:t>
+              <a:t>12/9/2020</a:t>
             </a:fld>
             <a:endParaRPr lang="en-US"/>
           </a:p>
@@ -460,7 +494,7 @@
           <a:p>
             <a:fld id="{84865227-8B12-4541-9CD8-0F4500E665CC}" type="datetimeFigureOut">
               <a:rPr lang="en-US" smtClean="0"/>
-              <a:t>12/7/2020</a:t>
+              <a:t>12/9/2020</a:t>
             </a:fld>
             <a:endParaRPr lang="en-US"/>
           </a:p>
@@ -683,7 +717,7 @@
           <a:p>
             <a:fld id="{84865227-8B12-4541-9CD8-0F4500E665CC}" type="datetimeFigureOut">
               <a:rPr lang="en-US" smtClean="0"/>
-              <a:t>12/7/2020</a:t>
+              <a:t>12/9/2020</a:t>
             </a:fld>
             <a:endParaRPr lang="en-US"/>
           </a:p>
@@ -863,7 +897,7 @@
           <a:p>
             <a:fld id="{84865227-8B12-4541-9CD8-0F4500E665CC}" type="datetimeFigureOut">
               <a:rPr lang="en-US" smtClean="0"/>
-              <a:t>12/7/2020</a:t>
+              <a:t>12/9/2020</a:t>
             </a:fld>
             <a:endParaRPr lang="en-US"/>
           </a:p>
@@ -1169,7 +1203,7 @@
           <a:p>
             <a:fld id="{84865227-8B12-4541-9CD8-0F4500E665CC}" type="datetimeFigureOut">
               <a:rPr lang="en-US" smtClean="0"/>
-              <a:t>12/7/2020</a:t>
+              <a:t>12/9/2020</a:t>
             </a:fld>
             <a:endParaRPr lang="en-US"/>
           </a:p>
@@ -1473,7 +1507,7 @@
           <a:p>
             <a:fld id="{84865227-8B12-4541-9CD8-0F4500E665CC}" type="datetimeFigureOut">
               <a:rPr lang="en-US" smtClean="0"/>
-              <a:t>12/7/2020</a:t>
+              <a:t>12/9/2020</a:t>
             </a:fld>
             <a:endParaRPr lang="en-US"/>
           </a:p>
@@ -1895,7 +1929,7 @@
           <a:p>
             <a:fld id="{84865227-8B12-4541-9CD8-0F4500E665CC}" type="datetimeFigureOut">
               <a:rPr lang="en-US" smtClean="0"/>
-              <a:t>12/7/2020</a:t>
+              <a:t>12/9/2020</a:t>
             </a:fld>
             <a:endParaRPr lang="en-US"/>
           </a:p>
@@ -2013,7 +2047,7 @@
           <a:p>
             <a:fld id="{84865227-8B12-4541-9CD8-0F4500E665CC}" type="datetimeFigureOut">
               <a:rPr lang="en-US" smtClean="0"/>
-              <a:t>12/7/2020</a:t>
+              <a:t>12/9/2020</a:t>
             </a:fld>
             <a:endParaRPr lang="en-US"/>
           </a:p>
@@ -2108,7 +2142,7 @@
           <a:p>
             <a:fld id="{84865227-8B12-4541-9CD8-0F4500E665CC}" type="datetimeFigureOut">
               <a:rPr lang="en-US" smtClean="0"/>
-              <a:t>12/7/2020</a:t>
+              <a:t>12/9/2020</a:t>
             </a:fld>
             <a:endParaRPr lang="en-US"/>
           </a:p>
@@ -2381,7 +2415,7 @@
           <a:p>
             <a:fld id="{84865227-8B12-4541-9CD8-0F4500E665CC}" type="datetimeFigureOut">
               <a:rPr lang="en-US" smtClean="0"/>
-              <a:t>12/7/2020</a:t>
+              <a:t>12/9/2020</a:t>
             </a:fld>
             <a:endParaRPr lang="en-US"/>
           </a:p>
@@ -2646,7 +2680,7 @@
           <a:p>
             <a:fld id="{84865227-8B12-4541-9CD8-0F4500E665CC}" type="datetimeFigureOut">
               <a:rPr lang="en-US" smtClean="0"/>
-              <a:t>12/7/2020</a:t>
+              <a:t>12/9/2020</a:t>
             </a:fld>
             <a:endParaRPr lang="en-US"/>
           </a:p>
@@ -2895,7 +2929,7 @@
           <a:p>
             <a:fld id="{84865227-8B12-4541-9CD8-0F4500E665CC}" type="datetimeFigureOut">
               <a:rPr lang="en-US" smtClean="0"/>
-              <a:t>12/7/2020</a:t>
+              <a:t>12/9/2020</a:t>
             </a:fld>
             <a:endParaRPr lang="en-US"/>
           </a:p>
@@ -4206,6 +4240,19 @@
               <a:t>Naming convention</a:t>
             </a:r>
           </a:p>
+          <a:p>
+            <a:r>
+              <a:rPr lang="en-US" dirty="0"/>
+              <a:t>Ask TA’s for advice earlier</a:t>
+            </a:r>
+          </a:p>
+          <a:p>
+            <a:r>
+              <a:rPr lang="en-US"/>
+              <a:t>Better debugging</a:t>
+            </a:r>
+            <a:endParaRPr lang="en-US" dirty="0"/>
+          </a:p>
         </p:txBody>
       </p:sp>
     </p:spTree>

</xml_diff>